<commit_message>
Update xds font color
</commit_message>
<xml_diff>
--- a/宣道詩/(宣道詩12B)耶穌我魂避難所.pptx
+++ b/宣道詩/(宣道詩12B)耶穌我魂避難所.pptx
@@ -291,7 +291,8 @@
           <a:p>
             <a:fld id="{0326A1AA-3272-4756-96E3-44E7F00AC348}" type="datetimeFigureOut">
               <a:rPr lang="vi-VN" smtClean="0"/>
-              <a:t>28/08/2020</a:t>
+              <a:pPr/>
+              <a:t>30/08/2020</a:t>
             </a:fld>
             <a:endParaRPr lang="vi-VN"/>
           </a:p>
@@ -333,6 +334,7 @@
           <a:p>
             <a:fld id="{EEAD8FF5-13A5-4DBB-9DFA-2F96D73AA7F0}" type="slidenum">
               <a:rPr lang="vi-VN" smtClean="0"/>
+              <a:pPr/>
               <a:t>‹#›</a:t>
             </a:fld>
             <a:endParaRPr lang="vi-VN"/>
@@ -342,7 +344,7 @@
     </p:spTree>
     <p:extLst>
       <p:ext uri="{BB962C8B-B14F-4D97-AF65-F5344CB8AC3E}">
-        <p14:creationId xmlns:p14="http://schemas.microsoft.com/office/powerpoint/2010/main" val="3149477313"/>
+        <p14:creationId xmlns:p14="http://schemas.microsoft.com/office/powerpoint/2010/main" xmlns="" val="3149477313"/>
       </p:ext>
     </p:extLst>
   </p:cSld>
@@ -461,7 +463,8 @@
           <a:p>
             <a:fld id="{0326A1AA-3272-4756-96E3-44E7F00AC348}" type="datetimeFigureOut">
               <a:rPr lang="vi-VN" smtClean="0"/>
-              <a:t>28/08/2020</a:t>
+              <a:pPr/>
+              <a:t>30/08/2020</a:t>
             </a:fld>
             <a:endParaRPr lang="vi-VN"/>
           </a:p>
@@ -503,6 +506,7 @@
           <a:p>
             <a:fld id="{EEAD8FF5-13A5-4DBB-9DFA-2F96D73AA7F0}" type="slidenum">
               <a:rPr lang="vi-VN" smtClean="0"/>
+              <a:pPr/>
               <a:t>‹#›</a:t>
             </a:fld>
             <a:endParaRPr lang="vi-VN"/>
@@ -512,7 +516,7 @@
     </p:spTree>
     <p:extLst>
       <p:ext uri="{BB962C8B-B14F-4D97-AF65-F5344CB8AC3E}">
-        <p14:creationId xmlns:p14="http://schemas.microsoft.com/office/powerpoint/2010/main" val="1595308811"/>
+        <p14:creationId xmlns:p14="http://schemas.microsoft.com/office/powerpoint/2010/main" xmlns="" val="1595308811"/>
       </p:ext>
     </p:extLst>
   </p:cSld>
@@ -641,7 +645,8 @@
           <a:p>
             <a:fld id="{0326A1AA-3272-4756-96E3-44E7F00AC348}" type="datetimeFigureOut">
               <a:rPr lang="vi-VN" smtClean="0"/>
-              <a:t>28/08/2020</a:t>
+              <a:pPr/>
+              <a:t>30/08/2020</a:t>
             </a:fld>
             <a:endParaRPr lang="vi-VN"/>
           </a:p>
@@ -683,6 +688,7 @@
           <a:p>
             <a:fld id="{EEAD8FF5-13A5-4DBB-9DFA-2F96D73AA7F0}" type="slidenum">
               <a:rPr lang="vi-VN" smtClean="0"/>
+              <a:pPr/>
               <a:t>‹#›</a:t>
             </a:fld>
             <a:endParaRPr lang="vi-VN"/>
@@ -692,7 +698,7 @@
     </p:spTree>
     <p:extLst>
       <p:ext uri="{BB962C8B-B14F-4D97-AF65-F5344CB8AC3E}">
-        <p14:creationId xmlns:p14="http://schemas.microsoft.com/office/powerpoint/2010/main" val="1823935827"/>
+        <p14:creationId xmlns:p14="http://schemas.microsoft.com/office/powerpoint/2010/main" xmlns="" val="1823935827"/>
       </p:ext>
     </p:extLst>
   </p:cSld>
@@ -811,7 +817,8 @@
           <a:p>
             <a:fld id="{0326A1AA-3272-4756-96E3-44E7F00AC348}" type="datetimeFigureOut">
               <a:rPr lang="vi-VN" smtClean="0"/>
-              <a:t>28/08/2020</a:t>
+              <a:pPr/>
+              <a:t>30/08/2020</a:t>
             </a:fld>
             <a:endParaRPr lang="vi-VN"/>
           </a:p>
@@ -853,6 +860,7 @@
           <a:p>
             <a:fld id="{EEAD8FF5-13A5-4DBB-9DFA-2F96D73AA7F0}" type="slidenum">
               <a:rPr lang="vi-VN" smtClean="0"/>
+              <a:pPr/>
               <a:t>‹#›</a:t>
             </a:fld>
             <a:endParaRPr lang="vi-VN"/>
@@ -862,7 +870,7 @@
     </p:spTree>
     <p:extLst>
       <p:ext uri="{BB962C8B-B14F-4D97-AF65-F5344CB8AC3E}">
-        <p14:creationId xmlns:p14="http://schemas.microsoft.com/office/powerpoint/2010/main" val="61797823"/>
+        <p14:creationId xmlns:p14="http://schemas.microsoft.com/office/powerpoint/2010/main" xmlns="" val="61797823"/>
       </p:ext>
     </p:extLst>
   </p:cSld>
@@ -1057,7 +1065,8 @@
           <a:p>
             <a:fld id="{0326A1AA-3272-4756-96E3-44E7F00AC348}" type="datetimeFigureOut">
               <a:rPr lang="vi-VN" smtClean="0"/>
-              <a:t>28/08/2020</a:t>
+              <a:pPr/>
+              <a:t>30/08/2020</a:t>
             </a:fld>
             <a:endParaRPr lang="vi-VN"/>
           </a:p>
@@ -1099,6 +1108,7 @@
           <a:p>
             <a:fld id="{EEAD8FF5-13A5-4DBB-9DFA-2F96D73AA7F0}" type="slidenum">
               <a:rPr lang="vi-VN" smtClean="0"/>
+              <a:pPr/>
               <a:t>‹#›</a:t>
             </a:fld>
             <a:endParaRPr lang="vi-VN"/>
@@ -1108,7 +1118,7 @@
     </p:spTree>
     <p:extLst>
       <p:ext uri="{BB962C8B-B14F-4D97-AF65-F5344CB8AC3E}">
-        <p14:creationId xmlns:p14="http://schemas.microsoft.com/office/powerpoint/2010/main" val="193676735"/>
+        <p14:creationId xmlns:p14="http://schemas.microsoft.com/office/powerpoint/2010/main" xmlns="" val="193676735"/>
       </p:ext>
     </p:extLst>
   </p:cSld>
@@ -1345,7 +1355,8 @@
           <a:p>
             <a:fld id="{0326A1AA-3272-4756-96E3-44E7F00AC348}" type="datetimeFigureOut">
               <a:rPr lang="vi-VN" smtClean="0"/>
-              <a:t>28/08/2020</a:t>
+              <a:pPr/>
+              <a:t>30/08/2020</a:t>
             </a:fld>
             <a:endParaRPr lang="vi-VN"/>
           </a:p>
@@ -1387,6 +1398,7 @@
           <a:p>
             <a:fld id="{EEAD8FF5-13A5-4DBB-9DFA-2F96D73AA7F0}" type="slidenum">
               <a:rPr lang="vi-VN" smtClean="0"/>
+              <a:pPr/>
               <a:t>‹#›</a:t>
             </a:fld>
             <a:endParaRPr lang="vi-VN"/>
@@ -1396,7 +1408,7 @@
     </p:spTree>
     <p:extLst>
       <p:ext uri="{BB962C8B-B14F-4D97-AF65-F5344CB8AC3E}">
-        <p14:creationId xmlns:p14="http://schemas.microsoft.com/office/powerpoint/2010/main" val="1022228378"/>
+        <p14:creationId xmlns:p14="http://schemas.microsoft.com/office/powerpoint/2010/main" xmlns="" val="1022228378"/>
       </p:ext>
     </p:extLst>
   </p:cSld>
@@ -1767,7 +1779,8 @@
           <a:p>
             <a:fld id="{0326A1AA-3272-4756-96E3-44E7F00AC348}" type="datetimeFigureOut">
               <a:rPr lang="vi-VN" smtClean="0"/>
-              <a:t>28/08/2020</a:t>
+              <a:pPr/>
+              <a:t>30/08/2020</a:t>
             </a:fld>
             <a:endParaRPr lang="vi-VN"/>
           </a:p>
@@ -1809,6 +1822,7 @@
           <a:p>
             <a:fld id="{EEAD8FF5-13A5-4DBB-9DFA-2F96D73AA7F0}" type="slidenum">
               <a:rPr lang="vi-VN" smtClean="0"/>
+              <a:pPr/>
               <a:t>‹#›</a:t>
             </a:fld>
             <a:endParaRPr lang="vi-VN"/>
@@ -1818,7 +1832,7 @@
     </p:spTree>
     <p:extLst>
       <p:ext uri="{BB962C8B-B14F-4D97-AF65-F5344CB8AC3E}">
-        <p14:creationId xmlns:p14="http://schemas.microsoft.com/office/powerpoint/2010/main" val="1921662012"/>
+        <p14:creationId xmlns:p14="http://schemas.microsoft.com/office/powerpoint/2010/main" xmlns="" val="1921662012"/>
       </p:ext>
     </p:extLst>
   </p:cSld>
@@ -1885,7 +1899,8 @@
           <a:p>
             <a:fld id="{0326A1AA-3272-4756-96E3-44E7F00AC348}" type="datetimeFigureOut">
               <a:rPr lang="vi-VN" smtClean="0"/>
-              <a:t>28/08/2020</a:t>
+              <a:pPr/>
+              <a:t>30/08/2020</a:t>
             </a:fld>
             <a:endParaRPr lang="vi-VN"/>
           </a:p>
@@ -1927,6 +1942,7 @@
           <a:p>
             <a:fld id="{EEAD8FF5-13A5-4DBB-9DFA-2F96D73AA7F0}" type="slidenum">
               <a:rPr lang="vi-VN" smtClean="0"/>
+              <a:pPr/>
               <a:t>‹#›</a:t>
             </a:fld>
             <a:endParaRPr lang="vi-VN"/>
@@ -1936,7 +1952,7 @@
     </p:spTree>
     <p:extLst>
       <p:ext uri="{BB962C8B-B14F-4D97-AF65-F5344CB8AC3E}">
-        <p14:creationId xmlns:p14="http://schemas.microsoft.com/office/powerpoint/2010/main" val="1375404376"/>
+        <p14:creationId xmlns:p14="http://schemas.microsoft.com/office/powerpoint/2010/main" xmlns="" val="1375404376"/>
       </p:ext>
     </p:extLst>
   </p:cSld>
@@ -1980,7 +1996,8 @@
           <a:p>
             <a:fld id="{0326A1AA-3272-4756-96E3-44E7F00AC348}" type="datetimeFigureOut">
               <a:rPr lang="vi-VN" smtClean="0"/>
-              <a:t>28/08/2020</a:t>
+              <a:pPr/>
+              <a:t>30/08/2020</a:t>
             </a:fld>
             <a:endParaRPr lang="vi-VN"/>
           </a:p>
@@ -2022,6 +2039,7 @@
           <a:p>
             <a:fld id="{EEAD8FF5-13A5-4DBB-9DFA-2F96D73AA7F0}" type="slidenum">
               <a:rPr lang="vi-VN" smtClean="0"/>
+              <a:pPr/>
               <a:t>‹#›</a:t>
             </a:fld>
             <a:endParaRPr lang="vi-VN"/>
@@ -2031,7 +2049,7 @@
     </p:spTree>
     <p:extLst>
       <p:ext uri="{BB962C8B-B14F-4D97-AF65-F5344CB8AC3E}">
-        <p14:creationId xmlns:p14="http://schemas.microsoft.com/office/powerpoint/2010/main" val="956982311"/>
+        <p14:creationId xmlns:p14="http://schemas.microsoft.com/office/powerpoint/2010/main" xmlns="" val="956982311"/>
       </p:ext>
     </p:extLst>
   </p:cSld>
@@ -2257,7 +2275,8 @@
           <a:p>
             <a:fld id="{0326A1AA-3272-4756-96E3-44E7F00AC348}" type="datetimeFigureOut">
               <a:rPr lang="vi-VN" smtClean="0"/>
-              <a:t>28/08/2020</a:t>
+              <a:pPr/>
+              <a:t>30/08/2020</a:t>
             </a:fld>
             <a:endParaRPr lang="vi-VN"/>
           </a:p>
@@ -2299,6 +2318,7 @@
           <a:p>
             <a:fld id="{EEAD8FF5-13A5-4DBB-9DFA-2F96D73AA7F0}" type="slidenum">
               <a:rPr lang="vi-VN" smtClean="0"/>
+              <a:pPr/>
               <a:t>‹#›</a:t>
             </a:fld>
             <a:endParaRPr lang="vi-VN"/>
@@ -2308,7 +2328,7 @@
     </p:spTree>
     <p:extLst>
       <p:ext uri="{BB962C8B-B14F-4D97-AF65-F5344CB8AC3E}">
-        <p14:creationId xmlns:p14="http://schemas.microsoft.com/office/powerpoint/2010/main" val="2579369062"/>
+        <p14:creationId xmlns:p14="http://schemas.microsoft.com/office/powerpoint/2010/main" xmlns="" val="2579369062"/>
       </p:ext>
     </p:extLst>
   </p:cSld>
@@ -2514,7 +2534,8 @@
           <a:p>
             <a:fld id="{0326A1AA-3272-4756-96E3-44E7F00AC348}" type="datetimeFigureOut">
               <a:rPr lang="vi-VN" smtClean="0"/>
-              <a:t>28/08/2020</a:t>
+              <a:pPr/>
+              <a:t>30/08/2020</a:t>
             </a:fld>
             <a:endParaRPr lang="vi-VN"/>
           </a:p>
@@ -2556,6 +2577,7 @@
           <a:p>
             <a:fld id="{EEAD8FF5-13A5-4DBB-9DFA-2F96D73AA7F0}" type="slidenum">
               <a:rPr lang="vi-VN" smtClean="0"/>
+              <a:pPr/>
               <a:t>‹#›</a:t>
             </a:fld>
             <a:endParaRPr lang="vi-VN"/>
@@ -2565,7 +2587,7 @@
     </p:spTree>
     <p:extLst>
       <p:ext uri="{BB962C8B-B14F-4D97-AF65-F5344CB8AC3E}">
-        <p14:creationId xmlns:p14="http://schemas.microsoft.com/office/powerpoint/2010/main" val="3714286795"/>
+        <p14:creationId xmlns:p14="http://schemas.microsoft.com/office/powerpoint/2010/main" xmlns="" val="3714286795"/>
       </p:ext>
     </p:extLst>
   </p:cSld>
@@ -2732,7 +2754,8 @@
           <a:p>
             <a:fld id="{0326A1AA-3272-4756-96E3-44E7F00AC348}" type="datetimeFigureOut">
               <a:rPr lang="vi-VN" smtClean="0"/>
-              <a:t>28/08/2020</a:t>
+              <a:pPr/>
+              <a:t>30/08/2020</a:t>
             </a:fld>
             <a:endParaRPr lang="vi-VN"/>
           </a:p>
@@ -2810,6 +2833,7 @@
           <a:p>
             <a:fld id="{EEAD8FF5-13A5-4DBB-9DFA-2F96D73AA7F0}" type="slidenum">
               <a:rPr lang="vi-VN" smtClean="0"/>
+              <a:pPr/>
               <a:t>‹#›</a:t>
             </a:fld>
             <a:endParaRPr lang="vi-VN"/>
@@ -2819,7 +2843,7 @@
     </p:spTree>
     <p:extLst>
       <p:ext uri="{BB962C8B-B14F-4D97-AF65-F5344CB8AC3E}">
-        <p14:creationId xmlns:p14="http://schemas.microsoft.com/office/powerpoint/2010/main" val="4262319478"/>
+        <p14:creationId xmlns:p14="http://schemas.microsoft.com/office/powerpoint/2010/main" xmlns="" val="4262319478"/>
       </p:ext>
     </p:extLst>
   </p:cSld>
@@ -3126,12 +3150,18 @@
           <a:p>
             <a:r>
               <a:rPr lang="zh-CN" altLang="en-US" sz="4800" b="1" dirty="0" smtClean="0">
+                <a:solidFill>
+                  <a:srgbClr val="002060"/>
+                </a:solidFill>
                 <a:latin typeface="Microsoft JhengHei" panose="020B0604030504040204" pitchFamily="34" charset="-120"/>
                 <a:ea typeface="Microsoft JhengHei" panose="020B0604030504040204" pitchFamily="34" charset="-120"/>
               </a:rPr>
               <a:t>耶穌我魂避難所</a:t>
             </a:r>
             <a:endParaRPr lang="vi-VN" sz="4800" b="1" dirty="0">
+              <a:solidFill>
+                <a:srgbClr val="002060"/>
+              </a:solidFill>
               <a:ea typeface="Microsoft JhengHei" panose="020B0604030504040204" pitchFamily="34" charset="-120"/>
             </a:endParaRPr>
           </a:p>
@@ -3159,6 +3189,9 @@
             </a:pPr>
             <a:r>
               <a:rPr lang="zh-CN" altLang="en-US" sz="5400" b="1" dirty="0">
+                <a:solidFill>
+                  <a:srgbClr val="002060"/>
+                </a:solidFill>
                 <a:latin typeface="Microsoft JhengHei" panose="020B0604030504040204" pitchFamily="34" charset="-120"/>
                 <a:ea typeface="Microsoft JhengHei" panose="020B0604030504040204" pitchFamily="34" charset="-120"/>
               </a:rPr>
@@ -3166,12 +3199,18 @@
             </a:r>
             <a:r>
               <a:rPr lang="zh-CN" altLang="en-US" sz="5400" b="1" dirty="0" smtClean="0">
+                <a:solidFill>
+                  <a:srgbClr val="002060"/>
+                </a:solidFill>
                 <a:latin typeface="Microsoft JhengHei" panose="020B0604030504040204" pitchFamily="34" charset="-120"/>
                 <a:ea typeface="Microsoft JhengHei" panose="020B0604030504040204" pitchFamily="34" charset="-120"/>
               </a:rPr>
               <a:t>所  容我投你懷中躲</a:t>
             </a:r>
             <a:endParaRPr lang="en-US" altLang="zh-CN" sz="5400" b="1" dirty="0" smtClean="0">
+              <a:solidFill>
+                <a:srgbClr val="002060"/>
+              </a:solidFill>
               <a:latin typeface="Microsoft JhengHei" panose="020B0604030504040204" pitchFamily="34" charset="-120"/>
               <a:ea typeface="Microsoft JhengHei" panose="020B0604030504040204" pitchFamily="34" charset="-120"/>
             </a:endParaRPr>
@@ -3182,12 +3221,18 @@
             </a:pPr>
             <a:r>
               <a:rPr lang="zh-CN" altLang="en-US" sz="5400" b="1" dirty="0" smtClean="0">
+                <a:solidFill>
+                  <a:srgbClr val="002060"/>
+                </a:solidFill>
                 <a:latin typeface="Microsoft JhengHei" panose="020B0604030504040204" pitchFamily="34" charset="-120"/>
                 <a:ea typeface="Microsoft JhengHei" panose="020B0604030504040204" pitchFamily="34" charset="-120"/>
               </a:rPr>
               <a:t>波濤滾滾浩無涯  風雷一片破空來</a:t>
             </a:r>
             <a:endParaRPr lang="en-US" altLang="zh-CN" sz="5400" b="1" dirty="0" smtClean="0">
+              <a:solidFill>
+                <a:srgbClr val="002060"/>
+              </a:solidFill>
               <a:latin typeface="Microsoft JhengHei" panose="020B0604030504040204" pitchFamily="34" charset="-120"/>
               <a:ea typeface="Microsoft JhengHei" panose="020B0604030504040204" pitchFamily="34" charset="-120"/>
             </a:endParaRPr>
@@ -3198,6 +3243,9 @@
             </a:pPr>
             <a:r>
               <a:rPr lang="zh-CN" altLang="en-US" sz="5400" b="1" dirty="0">
+                <a:solidFill>
+                  <a:srgbClr val="002060"/>
+                </a:solidFill>
                 <a:latin typeface="Microsoft JhengHei" panose="020B0604030504040204" pitchFamily="34" charset="-120"/>
                 <a:ea typeface="Microsoft JhengHei" panose="020B0604030504040204" pitchFamily="34" charset="-120"/>
               </a:rPr>
@@ -3205,12 +3253,18 @@
             </a:r>
             <a:r>
               <a:rPr lang="zh-CN" altLang="en-US" sz="5400" b="1" dirty="0" smtClean="0">
+                <a:solidFill>
+                  <a:srgbClr val="002060"/>
+                </a:solidFill>
                 <a:latin typeface="Microsoft JhengHei" panose="020B0604030504040204" pitchFamily="34" charset="-120"/>
                 <a:ea typeface="Microsoft JhengHei" panose="020B0604030504040204" pitchFamily="34" charset="-120"/>
               </a:rPr>
               <a:t>際  等此風濤漸停息</a:t>
             </a:r>
             <a:endParaRPr lang="en-US" altLang="zh-CN" sz="5400" b="1" dirty="0" smtClean="0">
+              <a:solidFill>
+                <a:srgbClr val="002060"/>
+              </a:solidFill>
               <a:latin typeface="Microsoft JhengHei" panose="020B0604030504040204" pitchFamily="34" charset="-120"/>
               <a:ea typeface="Microsoft JhengHei" panose="020B0604030504040204" pitchFamily="34" charset="-120"/>
             </a:endParaRPr>
@@ -3221,12 +3275,18 @@
             </a:pPr>
             <a:r>
               <a:rPr lang="zh-CN" altLang="en-US" sz="5400" b="1" dirty="0" smtClean="0">
+                <a:solidFill>
+                  <a:srgbClr val="002060"/>
+                </a:solidFill>
                 <a:latin typeface="Microsoft JhengHei" panose="020B0604030504040204" pitchFamily="34" charset="-120"/>
                 <a:ea typeface="Microsoft JhengHei" panose="020B0604030504040204" pitchFamily="34" charset="-120"/>
               </a:rPr>
               <a:t>引我平安入天門  至終接納我靈魂</a:t>
             </a:r>
             <a:endParaRPr lang="vi-VN" sz="5400" b="1" dirty="0">
+              <a:solidFill>
+                <a:srgbClr val="002060"/>
+              </a:solidFill>
               <a:ea typeface="Microsoft JhengHei" panose="020B0604030504040204" pitchFamily="34" charset="-120"/>
             </a:endParaRPr>
           </a:p>
@@ -3255,17 +3315,25 @@
           <a:lstStyle/>
           <a:p>
             <a:r>
-              <a:rPr lang="en-US" sz="4800" b="1" dirty="0" smtClean="0"/>
+              <a:rPr lang="en-US" sz="4800" b="1" dirty="0" smtClean="0">
+                <a:solidFill>
+                  <a:srgbClr val="002060"/>
+                </a:solidFill>
+              </a:rPr>
               <a:t>1.</a:t>
             </a:r>
-            <a:endParaRPr lang="vi-VN" sz="4800" b="1" dirty="0"/>
+            <a:endParaRPr lang="vi-VN" sz="4800" b="1" dirty="0">
+              <a:solidFill>
+                <a:srgbClr val="002060"/>
+              </a:solidFill>
+            </a:endParaRPr>
           </a:p>
         </p:txBody>
       </p:sp>
     </p:spTree>
     <p:extLst>
       <p:ext uri="{BB962C8B-B14F-4D97-AF65-F5344CB8AC3E}">
-        <p14:creationId xmlns:p14="http://schemas.microsoft.com/office/powerpoint/2010/main" val="1957755255"/>
+        <p14:creationId xmlns:p14="http://schemas.microsoft.com/office/powerpoint/2010/main" xmlns="" val="1957755255"/>
       </p:ext>
     </p:extLst>
   </p:cSld>
@@ -3311,12 +3379,18 @@
           <a:p>
             <a:r>
               <a:rPr lang="zh-CN" altLang="en-US" sz="4800" b="1" dirty="0" smtClean="0">
+                <a:solidFill>
+                  <a:srgbClr val="002060"/>
+                </a:solidFill>
                 <a:latin typeface="Microsoft JhengHei" panose="020B0604030504040204" pitchFamily="34" charset="-120"/>
                 <a:ea typeface="Microsoft JhengHei" panose="020B0604030504040204" pitchFamily="34" charset="-120"/>
               </a:rPr>
               <a:t>耶穌我魂避難所</a:t>
             </a:r>
             <a:endParaRPr lang="vi-VN" sz="4800" b="1" dirty="0">
+              <a:solidFill>
+                <a:srgbClr val="002060"/>
+              </a:solidFill>
               <a:ea typeface="Microsoft JhengHei" panose="020B0604030504040204" pitchFamily="34" charset="-120"/>
             </a:endParaRPr>
           </a:p>
@@ -3344,11 +3418,17 @@
             </a:pPr>
             <a:r>
               <a:rPr lang="zh-CN" altLang="en-US" sz="5400" b="1" dirty="0" smtClean="0">
+                <a:solidFill>
+                  <a:srgbClr val="002060"/>
+                </a:solidFill>
                 <a:ea typeface="Microsoft JhengHei" panose="020B0604030504040204" pitchFamily="34" charset="-120"/>
               </a:rPr>
               <a:t>此外別無避難所  惟賴救主保護我</a:t>
             </a:r>
             <a:endParaRPr lang="en-US" altLang="zh-CN" sz="5400" b="1" dirty="0" smtClean="0">
+              <a:solidFill>
+                <a:srgbClr val="002060"/>
+              </a:solidFill>
               <a:ea typeface="Microsoft JhengHei" panose="020B0604030504040204" pitchFamily="34" charset="-120"/>
             </a:endParaRPr>
           </a:p>
@@ -3358,17 +3438,26 @@
             </a:pPr>
             <a:r>
               <a:rPr lang="zh-CN" altLang="en-US" sz="5400" b="1" dirty="0">
+                <a:solidFill>
+                  <a:srgbClr val="002060"/>
+                </a:solidFill>
                 <a:ea typeface="Microsoft JhengHei" panose="020B0604030504040204" pitchFamily="34" charset="-120"/>
               </a:rPr>
               <a:t>求匆遺我</a:t>
             </a:r>
             <a:r>
               <a:rPr lang="zh-CN" altLang="en-US" sz="5400" b="1" dirty="0" smtClean="0">
+                <a:solidFill>
+                  <a:srgbClr val="002060"/>
+                </a:solidFill>
                 <a:ea typeface="Microsoft JhengHei" panose="020B0604030504040204" pitchFamily="34" charset="-120"/>
               </a:rPr>
               <a:t>致孤單  仍舊扶持賜平安</a:t>
             </a:r>
             <a:endParaRPr lang="en-US" altLang="zh-CN" sz="5400" b="1" dirty="0" smtClean="0">
+              <a:solidFill>
+                <a:srgbClr val="002060"/>
+              </a:solidFill>
               <a:ea typeface="Microsoft JhengHei" panose="020B0604030504040204" pitchFamily="34" charset="-120"/>
             </a:endParaRPr>
           </a:p>
@@ -3378,17 +3467,26 @@
             </a:pPr>
             <a:r>
               <a:rPr lang="zh-CN" altLang="en-US" sz="5400" b="1" dirty="0">
+                <a:solidFill>
+                  <a:srgbClr val="002060"/>
+                </a:solidFill>
                 <a:ea typeface="Microsoft JhengHei" panose="020B0604030504040204" pitchFamily="34" charset="-120"/>
               </a:rPr>
               <a:t>我心惟有主可</a:t>
             </a:r>
             <a:r>
               <a:rPr lang="zh-CN" altLang="en-US" sz="5400" b="1" dirty="0" smtClean="0">
+                <a:solidFill>
+                  <a:srgbClr val="002060"/>
+                </a:solidFill>
                 <a:ea typeface="Microsoft JhengHei" panose="020B0604030504040204" pitchFamily="34" charset="-120"/>
               </a:rPr>
               <a:t>恃  我力全由主所賜</a:t>
             </a:r>
             <a:endParaRPr lang="en-US" altLang="zh-CN" sz="5400" b="1" dirty="0" smtClean="0">
+              <a:solidFill>
+                <a:srgbClr val="002060"/>
+              </a:solidFill>
               <a:ea typeface="Microsoft JhengHei" panose="020B0604030504040204" pitchFamily="34" charset="-120"/>
             </a:endParaRPr>
           </a:p>
@@ -3398,23 +3496,35 @@
             </a:pPr>
             <a:r>
               <a:rPr lang="zh-CN" altLang="en-US" sz="5400" b="1" dirty="0">
+                <a:solidFill>
+                  <a:srgbClr val="002060"/>
+                </a:solidFill>
                 <a:ea typeface="Microsoft JhengHei" panose="020B0604030504040204" pitchFamily="34" charset="-120"/>
               </a:rPr>
               <a:t>可</a:t>
             </a:r>
             <a:r>
               <a:rPr lang="zh-CN" altLang="en-US" sz="5400" b="1" dirty="0" smtClean="0">
+                <a:solidFill>
+                  <a:srgbClr val="002060"/>
+                </a:solidFill>
                 <a:ea typeface="Microsoft JhengHei" panose="020B0604030504040204" pitchFamily="34" charset="-120"/>
               </a:rPr>
               <a:t>憐我身無蔭庇  求主在</a:t>
             </a:r>
             <a:r>
               <a:rPr lang="zh-CN" altLang="en-US" sz="5400" b="1" dirty="0">
+                <a:solidFill>
+                  <a:srgbClr val="002060"/>
+                </a:solidFill>
                 <a:ea typeface="Microsoft JhengHei" panose="020B0604030504040204" pitchFamily="34" charset="-120"/>
               </a:rPr>
               <a:t>上常覆翼</a:t>
             </a:r>
             <a:endParaRPr lang="vi-VN" sz="5400" b="1" dirty="0">
+              <a:solidFill>
+                <a:srgbClr val="002060"/>
+              </a:solidFill>
               <a:ea typeface="Microsoft JhengHei" panose="020B0604030504040204" pitchFamily="34" charset="-120"/>
             </a:endParaRPr>
           </a:p>
@@ -3443,21 +3553,33 @@
           <a:lstStyle/>
           <a:p>
             <a:r>
-              <a:rPr lang="en-US" sz="4800" b="1" dirty="0"/>
+              <a:rPr lang="en-US" sz="4800" b="1" dirty="0">
+                <a:solidFill>
+                  <a:srgbClr val="002060"/>
+                </a:solidFill>
+              </a:rPr>
               <a:t>2</a:t>
             </a:r>
             <a:r>
-              <a:rPr lang="en-US" sz="4800" b="1" dirty="0" smtClean="0"/>
+              <a:rPr lang="en-US" sz="4800" b="1" dirty="0" smtClean="0">
+                <a:solidFill>
+                  <a:srgbClr val="002060"/>
+                </a:solidFill>
+              </a:rPr>
               <a:t>.</a:t>
             </a:r>
-            <a:endParaRPr lang="vi-VN" sz="4800" b="1" dirty="0"/>
+            <a:endParaRPr lang="vi-VN" sz="4800" b="1" dirty="0">
+              <a:solidFill>
+                <a:srgbClr val="002060"/>
+              </a:solidFill>
+            </a:endParaRPr>
           </a:p>
         </p:txBody>
       </p:sp>
     </p:spTree>
     <p:extLst>
       <p:ext uri="{BB962C8B-B14F-4D97-AF65-F5344CB8AC3E}">
-        <p14:creationId xmlns:p14="http://schemas.microsoft.com/office/powerpoint/2010/main" val="2362798768"/>
+        <p14:creationId xmlns:p14="http://schemas.microsoft.com/office/powerpoint/2010/main" xmlns="" val="2362798768"/>
       </p:ext>
     </p:extLst>
   </p:cSld>
@@ -3503,12 +3625,18 @@
           <a:p>
             <a:r>
               <a:rPr lang="zh-CN" altLang="en-US" sz="4800" b="1" dirty="0" smtClean="0">
+                <a:solidFill>
+                  <a:srgbClr val="002060"/>
+                </a:solidFill>
                 <a:latin typeface="Microsoft JhengHei" panose="020B0604030504040204" pitchFamily="34" charset="-120"/>
                 <a:ea typeface="Microsoft JhengHei" panose="020B0604030504040204" pitchFamily="34" charset="-120"/>
               </a:rPr>
               <a:t>耶穌我魂避難所</a:t>
             </a:r>
             <a:endParaRPr lang="vi-VN" sz="4800" b="1" dirty="0">
+              <a:solidFill>
+                <a:srgbClr val="002060"/>
+              </a:solidFill>
               <a:ea typeface="Microsoft JhengHei" panose="020B0604030504040204" pitchFamily="34" charset="-120"/>
             </a:endParaRPr>
           </a:p>
@@ -3536,11 +3664,17 @@
             </a:pPr>
             <a:r>
               <a:rPr lang="zh-CN" altLang="en-US" sz="5400" b="1" dirty="0" smtClean="0">
+                <a:solidFill>
+                  <a:srgbClr val="002060"/>
+                </a:solidFill>
                 <a:ea typeface="Microsoft JhengHei" panose="020B0604030504040204" pitchFamily="34" charset="-120"/>
               </a:rPr>
               <a:t>所需全在主身上  所得過於我所望</a:t>
             </a:r>
             <a:endParaRPr lang="en-US" altLang="zh-CN" sz="5400" b="1" dirty="0" smtClean="0">
+              <a:solidFill>
+                <a:srgbClr val="002060"/>
+              </a:solidFill>
               <a:ea typeface="Microsoft JhengHei" panose="020B0604030504040204" pitchFamily="34" charset="-120"/>
             </a:endParaRPr>
           </a:p>
@@ -3550,17 +3684,26 @@
             </a:pPr>
             <a:r>
               <a:rPr lang="zh-CN" altLang="en-US" sz="5400" b="1" dirty="0">
+                <a:solidFill>
+                  <a:srgbClr val="002060"/>
+                </a:solidFill>
                 <a:ea typeface="Microsoft JhengHei" panose="020B0604030504040204" pitchFamily="34" charset="-120"/>
               </a:rPr>
               <a:t>仆蒙扶起弱蒙保  病蒙醫治</a:t>
             </a:r>
             <a:r>
               <a:rPr lang="zh-CN" altLang="en-US" sz="5400" b="1" dirty="0" smtClean="0">
+                <a:solidFill>
+                  <a:srgbClr val="002060"/>
+                </a:solidFill>
                 <a:ea typeface="Microsoft JhengHei" panose="020B0604030504040204" pitchFamily="34" charset="-120"/>
               </a:rPr>
               <a:t>瞽蒙導</a:t>
             </a:r>
             <a:endParaRPr lang="en-US" altLang="zh-CN" sz="5400" b="1" dirty="0" smtClean="0">
+              <a:solidFill>
+                <a:srgbClr val="002060"/>
+              </a:solidFill>
               <a:ea typeface="Microsoft JhengHei" panose="020B0604030504040204" pitchFamily="34" charset="-120"/>
             </a:endParaRPr>
           </a:p>
@@ -3570,17 +3713,26 @@
             </a:pPr>
             <a:r>
               <a:rPr lang="zh-CN" altLang="en-US" sz="5400" b="1" dirty="0">
+                <a:solidFill>
+                  <a:srgbClr val="002060"/>
+                </a:solidFill>
                 <a:ea typeface="Microsoft JhengHei" panose="020B0604030504040204" pitchFamily="34" charset="-120"/>
               </a:rPr>
               <a:t>主名至義至聖潔  我無一善惟罪</a:t>
             </a:r>
             <a:r>
               <a:rPr lang="zh-CN" altLang="en-US" sz="5400" b="1" dirty="0" smtClean="0">
+                <a:solidFill>
+                  <a:srgbClr val="002060"/>
+                </a:solidFill>
                 <a:ea typeface="Microsoft JhengHei" panose="020B0604030504040204" pitchFamily="34" charset="-120"/>
               </a:rPr>
               <a:t>孽</a:t>
             </a:r>
             <a:endParaRPr lang="en-US" altLang="zh-CN" sz="5400" b="1" dirty="0" smtClean="0">
+              <a:solidFill>
+                <a:srgbClr val="002060"/>
+              </a:solidFill>
               <a:ea typeface="Microsoft JhengHei" panose="020B0604030504040204" pitchFamily="34" charset="-120"/>
             </a:endParaRPr>
           </a:p>
@@ -3590,17 +3742,26 @@
             </a:pPr>
             <a:r>
               <a:rPr lang="zh-CN" altLang="en-US" sz="5400" b="1" dirty="0">
+                <a:solidFill>
+                  <a:srgbClr val="002060"/>
+                </a:solidFill>
                 <a:ea typeface="Microsoft JhengHei" panose="020B0604030504040204" pitchFamily="34" charset="-120"/>
               </a:rPr>
               <a:t>我心虛偽惡徧</a:t>
             </a:r>
             <a:r>
               <a:rPr lang="zh-CN" altLang="en-US" sz="5400" b="1" dirty="0" smtClean="0">
+                <a:solidFill>
+                  <a:srgbClr val="002060"/>
+                </a:solidFill>
                 <a:ea typeface="Microsoft JhengHei" panose="020B0604030504040204" pitchFamily="34" charset="-120"/>
               </a:rPr>
               <a:t>染  恩寵真理主充滿</a:t>
             </a:r>
             <a:endParaRPr lang="vi-VN" sz="5400" b="1" dirty="0">
+              <a:solidFill>
+                <a:srgbClr val="002060"/>
+              </a:solidFill>
               <a:ea typeface="Microsoft JhengHei" panose="020B0604030504040204" pitchFamily="34" charset="-120"/>
             </a:endParaRPr>
           </a:p>
@@ -3629,17 +3790,25 @@
           <a:lstStyle/>
           <a:p>
             <a:r>
-              <a:rPr lang="en-US" sz="4800" b="1" dirty="0" smtClean="0"/>
+              <a:rPr lang="en-US" sz="4800" b="1" dirty="0" smtClean="0">
+                <a:solidFill>
+                  <a:srgbClr val="002060"/>
+                </a:solidFill>
+              </a:rPr>
               <a:t>3.</a:t>
             </a:r>
-            <a:endParaRPr lang="vi-VN" sz="4800" b="1" dirty="0"/>
+            <a:endParaRPr lang="vi-VN" sz="4800" b="1" dirty="0">
+              <a:solidFill>
+                <a:srgbClr val="002060"/>
+              </a:solidFill>
+            </a:endParaRPr>
           </a:p>
         </p:txBody>
       </p:sp>
     </p:spTree>
     <p:extLst>
       <p:ext uri="{BB962C8B-B14F-4D97-AF65-F5344CB8AC3E}">
-        <p14:creationId xmlns:p14="http://schemas.microsoft.com/office/powerpoint/2010/main" val="3310194791"/>
+        <p14:creationId xmlns:p14="http://schemas.microsoft.com/office/powerpoint/2010/main" xmlns="" val="3310194791"/>
       </p:ext>
     </p:extLst>
   </p:cSld>
@@ -3685,12 +3854,18 @@
           <a:p>
             <a:r>
               <a:rPr lang="zh-CN" altLang="en-US" sz="4800" b="1" dirty="0" smtClean="0">
+                <a:solidFill>
+                  <a:srgbClr val="002060"/>
+                </a:solidFill>
                 <a:latin typeface="Microsoft JhengHei" panose="020B0604030504040204" pitchFamily="34" charset="-120"/>
                 <a:ea typeface="Microsoft JhengHei" panose="020B0604030504040204" pitchFamily="34" charset="-120"/>
               </a:rPr>
               <a:t>耶穌我魂避難所</a:t>
             </a:r>
             <a:endParaRPr lang="vi-VN" sz="4800" b="1" dirty="0">
+              <a:solidFill>
+                <a:srgbClr val="002060"/>
+              </a:solidFill>
               <a:ea typeface="Microsoft JhengHei" panose="020B0604030504040204" pitchFamily="34" charset="-120"/>
             </a:endParaRPr>
           </a:p>
@@ -3718,17 +3893,26 @@
             </a:pPr>
             <a:r>
               <a:rPr lang="zh-CN" altLang="en-US" sz="5400" b="1" dirty="0">
+                <a:solidFill>
+                  <a:srgbClr val="002060"/>
+                </a:solidFill>
                 <a:ea typeface="Microsoft JhengHei" panose="020B0604030504040204" pitchFamily="34" charset="-120"/>
               </a:rPr>
               <a:t>我主恩典真無極  此恩能掩我罪</a:t>
             </a:r>
             <a:r>
               <a:rPr lang="zh-CN" altLang="en-US" sz="5400" b="1" dirty="0" smtClean="0">
+                <a:solidFill>
+                  <a:srgbClr val="002060"/>
+                </a:solidFill>
                 <a:ea typeface="Microsoft JhengHei" panose="020B0604030504040204" pitchFamily="34" charset="-120"/>
               </a:rPr>
               <a:t>跡</a:t>
             </a:r>
             <a:endParaRPr lang="en-US" altLang="zh-CN" sz="5400" b="1" dirty="0" smtClean="0">
+              <a:solidFill>
+                <a:srgbClr val="002060"/>
+              </a:solidFill>
               <a:ea typeface="Microsoft JhengHei" panose="020B0604030504040204" pitchFamily="34" charset="-120"/>
             </a:endParaRPr>
           </a:p>
@@ -3738,17 +3922,26 @@
             </a:pPr>
             <a:r>
               <a:rPr lang="zh-CN" altLang="en-US" sz="5400" b="1" dirty="0">
+                <a:solidFill>
+                  <a:srgbClr val="002060"/>
+                </a:solidFill>
                 <a:ea typeface="Microsoft JhengHei" panose="020B0604030504040204" pitchFamily="34" charset="-120"/>
               </a:rPr>
               <a:t>醫</a:t>
             </a:r>
             <a:r>
               <a:rPr lang="zh-CN" altLang="en-US" sz="5400" b="1" dirty="0" smtClean="0">
+                <a:solidFill>
+                  <a:srgbClr val="002060"/>
+                </a:solidFill>
                 <a:ea typeface="Microsoft JhengHei" panose="020B0604030504040204" pitchFamily="34" charset="-120"/>
               </a:rPr>
               <a:t>病恩泉望湧出  保我心清無惡慾</a:t>
             </a:r>
             <a:endParaRPr lang="en-US" altLang="zh-CN" sz="5400" b="1" dirty="0" smtClean="0">
+              <a:solidFill>
+                <a:srgbClr val="002060"/>
+              </a:solidFill>
               <a:ea typeface="Microsoft JhengHei" panose="020B0604030504040204" pitchFamily="34" charset="-120"/>
             </a:endParaRPr>
           </a:p>
@@ -3758,11 +3951,17 @@
             </a:pPr>
             <a:r>
               <a:rPr lang="zh-CN" altLang="en-US" sz="5400" b="1" dirty="0" smtClean="0">
+                <a:solidFill>
+                  <a:srgbClr val="002060"/>
+                </a:solidFill>
                 <a:ea typeface="Microsoft JhengHei" panose="020B0604030504040204" pitchFamily="34" charset="-120"/>
               </a:rPr>
               <a:t>我主就是生命源  讓我盡量飲活泉</a:t>
             </a:r>
             <a:endParaRPr lang="en-US" altLang="zh-CN" sz="5400" b="1" dirty="0" smtClean="0">
+              <a:solidFill>
+                <a:srgbClr val="002060"/>
+              </a:solidFill>
               <a:ea typeface="Microsoft JhengHei" panose="020B0604030504040204" pitchFamily="34" charset="-120"/>
             </a:endParaRPr>
           </a:p>
@@ -3772,11 +3971,17 @@
             </a:pPr>
             <a:r>
               <a:rPr lang="zh-CN" altLang="en-US" sz="5400" b="1" smtClean="0">
+                <a:solidFill>
+                  <a:srgbClr val="002060"/>
+                </a:solidFill>
                 <a:ea typeface="Microsoft JhengHei" panose="020B0604030504040204" pitchFamily="34" charset="-120"/>
               </a:rPr>
               <a:t>願主在我心湧起  一直湧到永生裏</a:t>
             </a:r>
             <a:endParaRPr lang="vi-VN" sz="5400" b="1" dirty="0">
+              <a:solidFill>
+                <a:srgbClr val="002060"/>
+              </a:solidFill>
               <a:ea typeface="Microsoft JhengHei" panose="020B0604030504040204" pitchFamily="34" charset="-120"/>
             </a:endParaRPr>
           </a:p>
@@ -3805,21 +4010,33 @@
           <a:lstStyle/>
           <a:p>
             <a:r>
-              <a:rPr lang="en-US" sz="4800" b="1" dirty="0"/>
+              <a:rPr lang="en-US" sz="4800" b="1" dirty="0">
+                <a:solidFill>
+                  <a:srgbClr val="002060"/>
+                </a:solidFill>
+              </a:rPr>
               <a:t>4</a:t>
             </a:r>
             <a:r>
-              <a:rPr lang="en-US" sz="4800" b="1" dirty="0" smtClean="0"/>
+              <a:rPr lang="en-US" sz="4800" b="1" dirty="0" smtClean="0">
+                <a:solidFill>
+                  <a:srgbClr val="002060"/>
+                </a:solidFill>
+              </a:rPr>
               <a:t>.</a:t>
             </a:r>
-            <a:endParaRPr lang="vi-VN" sz="4800" b="1" dirty="0"/>
+            <a:endParaRPr lang="vi-VN" sz="4800" b="1" dirty="0">
+              <a:solidFill>
+                <a:srgbClr val="002060"/>
+              </a:solidFill>
+            </a:endParaRPr>
           </a:p>
         </p:txBody>
       </p:sp>
     </p:spTree>
     <p:extLst>
       <p:ext uri="{BB962C8B-B14F-4D97-AF65-F5344CB8AC3E}">
-        <p14:creationId xmlns:p14="http://schemas.microsoft.com/office/powerpoint/2010/main" val="3552922574"/>
+        <p14:creationId xmlns:p14="http://schemas.microsoft.com/office/powerpoint/2010/main" xmlns="" val="3552922574"/>
       </p:ext>
     </p:extLst>
   </p:cSld>
@@ -4111,7 +4328,7 @@
   <a:extraClrSchemeLst/>
   <a:extLst>
     <a:ext uri="{05A4C25C-085E-4340-85A3-A5531E510DB2}">
-      <thm15:themeFamily xmlns:thm15="http://schemas.microsoft.com/office/thememl/2012/main" name="Theme1" id="{AFC7C034-021A-479F-A5B0-F4AE2AC2A6F8}" vid="{E4B01A5C-7C0B-4AB8-8973-047186F18E30}"/>
+      <thm15:themeFamily xmlns:thm15="http://schemas.microsoft.com/office/thememl/2012/main" xmlns="" name="Theme1" id="{AFC7C034-021A-479F-A5B0-F4AE2AC2A6F8}" vid="{E4B01A5C-7C0B-4AB8-8973-047186F18E30}"/>
     </a:ext>
   </a:extLst>
 </a:theme>

</xml_diff>